<commit_message>
Correct part2 branch and pptx improvements
</commit_message>
<xml_diff>
--- a/Datalad-Part-3.pptx
+++ b/Datalad-Part-3.pptx
@@ -9,6 +9,8 @@
     <p:sldId id="257" r:id="rId3"/>
     <p:sldId id="259" r:id="rId4"/>
     <p:sldId id="260" r:id="rId5"/>
+    <p:sldId id="261" r:id="rId6"/>
+    <p:sldId id="262" r:id="rId7"/>
   </p:sldIdLst>
   <p:sldSz cx="12192000" cy="6858000"/>
   <p:notesSz cx="6858000" cy="9144000"/>
@@ -107,6 +109,11 @@
       </a:defRPr>
     </a:lvl9pPr>
   </p:defaultTextStyle>
+  <p:extLst>
+    <p:ext uri="{EFAFB233-063F-42B5-8137-9DF3F51BA10A}">
+      <p15:sldGuideLst xmlns:p15="http://schemas.microsoft.com/office/powerpoint/2012/main"/>
+    </p:ext>
+  </p:extLst>
 </p:presentation>
 </file>
 
@@ -1917,7 +1924,7 @@
           <a:p>
             <a:fld id="{5CF164AB-E133-EF45-BD2F-F2E1B6D97C43}" type="datetimeFigureOut">
               <a:rPr lang="en-US" smtClean="0"/>
-              <a:t>9/13/24</a:t>
+              <a:t>10/25/24</a:t>
             </a:fld>
             <a:endParaRPr lang="en-US"/>
           </a:p>
@@ -2431,7 +2438,7 @@
                   <a:srgbClr val="FF0000"/>
                 </a:solidFill>
               </a:rPr>
-              <a:t>Sep 20, 2024</a:t>
+              <a:t>Oct 25, 2024</a:t>
             </a:r>
           </a:p>
         </p:txBody>
@@ -3511,6 +3518,230 @@
     <p:extLst>
       <p:ext uri="{BB962C8B-B14F-4D97-AF65-F5344CB8AC3E}">
         <p14:creationId xmlns:p14="http://schemas.microsoft.com/office/powerpoint/2010/main" val="3996005075"/>
+      </p:ext>
+    </p:extLst>
+  </p:cSld>
+  <p:clrMapOvr>
+    <a:masterClrMapping/>
+  </p:clrMapOvr>
+</p:sld>
+</file>
+
+<file path=ppt/slides/slide5.xml><?xml version="1.0" encoding="utf-8"?>
+<p:sld xmlns:a="http://schemas.openxmlformats.org/drawingml/2006/main" xmlns:r="http://schemas.openxmlformats.org/officeDocument/2006/relationships" xmlns:p="http://schemas.openxmlformats.org/presentationml/2006/main">
+  <p:cSld>
+    <p:spTree>
+      <p:nvGrpSpPr>
+        <p:cNvPr id="1" name=""/>
+        <p:cNvGrpSpPr/>
+        <p:nvPr/>
+      </p:nvGrpSpPr>
+      <p:grpSpPr>
+        <a:xfrm>
+          <a:off x="0" y="0"/>
+          <a:ext cx="0" cy="0"/>
+          <a:chOff x="0" y="0"/>
+          <a:chExt cx="0" cy="0"/>
+        </a:xfrm>
+      </p:grpSpPr>
+      <p:sp>
+        <p:nvSpPr>
+          <p:cNvPr id="2" name="Title 1">
+            <a:extLst>
+              <a:ext uri="{FF2B5EF4-FFF2-40B4-BE49-F238E27FC236}">
+                <a16:creationId xmlns:a16="http://schemas.microsoft.com/office/drawing/2014/main" id="{4B589341-FB05-35D5-5F0C-88B73D2D06DA}"/>
+              </a:ext>
+            </a:extLst>
+          </p:cNvPr>
+          <p:cNvSpPr>
+            <a:spLocks noGrp="1"/>
+          </p:cNvSpPr>
+          <p:nvPr>
+            <p:ph type="title"/>
+          </p:nvPr>
+        </p:nvSpPr>
+        <p:spPr/>
+        <p:txBody>
+          <a:bodyPr/>
+          <a:lstStyle/>
+          <a:p>
+            <a:endParaRPr lang="en-US"/>
+          </a:p>
+        </p:txBody>
+      </p:sp>
+      <p:sp>
+        <p:nvSpPr>
+          <p:cNvPr id="3" name="Content Placeholder 2">
+            <a:extLst>
+              <a:ext uri="{FF2B5EF4-FFF2-40B4-BE49-F238E27FC236}">
+                <a16:creationId xmlns:a16="http://schemas.microsoft.com/office/drawing/2014/main" id="{FF5D526C-34DD-078D-6DC2-787FDA11670B}"/>
+              </a:ext>
+            </a:extLst>
+          </p:cNvPr>
+          <p:cNvSpPr>
+            <a:spLocks noGrp="1"/>
+          </p:cNvSpPr>
+          <p:nvPr>
+            <p:ph idx="1"/>
+          </p:nvPr>
+        </p:nvSpPr>
+        <p:spPr/>
+        <p:txBody>
+          <a:bodyPr/>
+          <a:lstStyle/>
+          <a:p>
+            <a:endParaRPr lang="en-US"/>
+          </a:p>
+        </p:txBody>
+      </p:sp>
+    </p:spTree>
+    <p:extLst>
+      <p:ext uri="{BB962C8B-B14F-4D97-AF65-F5344CB8AC3E}">
+        <p14:creationId xmlns:p14="http://schemas.microsoft.com/office/powerpoint/2010/main" val="69359617"/>
+      </p:ext>
+    </p:extLst>
+  </p:cSld>
+  <p:clrMapOvr>
+    <a:masterClrMapping/>
+  </p:clrMapOvr>
+</p:sld>
+</file>
+
+<file path=ppt/slides/slide6.xml><?xml version="1.0" encoding="utf-8"?>
+<p:sld xmlns:a="http://schemas.openxmlformats.org/drawingml/2006/main" xmlns:r="http://schemas.openxmlformats.org/officeDocument/2006/relationships" xmlns:p="http://schemas.openxmlformats.org/presentationml/2006/main">
+  <p:cSld>
+    <p:spTree>
+      <p:nvGrpSpPr>
+        <p:cNvPr id="1" name=""/>
+        <p:cNvGrpSpPr/>
+        <p:nvPr/>
+      </p:nvGrpSpPr>
+      <p:grpSpPr>
+        <a:xfrm>
+          <a:off x="0" y="0"/>
+          <a:ext cx="0" cy="0"/>
+          <a:chOff x="0" y="0"/>
+          <a:chExt cx="0" cy="0"/>
+        </a:xfrm>
+      </p:grpSpPr>
+      <p:sp>
+        <p:nvSpPr>
+          <p:cNvPr id="2" name="Title 1">
+            <a:extLst>
+              <a:ext uri="{FF2B5EF4-FFF2-40B4-BE49-F238E27FC236}">
+                <a16:creationId xmlns:a16="http://schemas.microsoft.com/office/drawing/2014/main" id="{5D27DFC4-B67F-5B39-F388-AB70B434E0B8}"/>
+              </a:ext>
+            </a:extLst>
+          </p:cNvPr>
+          <p:cNvSpPr>
+            <a:spLocks noGrp="1"/>
+          </p:cNvSpPr>
+          <p:nvPr>
+            <p:ph type="ctrTitle"/>
+          </p:nvPr>
+        </p:nvSpPr>
+        <p:spPr/>
+        <p:txBody>
+          <a:bodyPr/>
+          <a:lstStyle/>
+          <a:p>
+            <a:r>
+              <a:rPr lang="en-US" dirty="0"/>
+              <a:t>Thank you for your attention:</a:t>
+            </a:r>
+          </a:p>
+        </p:txBody>
+      </p:sp>
+      <p:sp>
+        <p:nvSpPr>
+          <p:cNvPr id="3" name="Subtitle 2">
+            <a:extLst>
+              <a:ext uri="{FF2B5EF4-FFF2-40B4-BE49-F238E27FC236}">
+                <a16:creationId xmlns:a16="http://schemas.microsoft.com/office/drawing/2014/main" id="{83DF6D06-899F-168D-74FD-40C45220EE98}"/>
+              </a:ext>
+            </a:extLst>
+          </p:cNvPr>
+          <p:cNvSpPr>
+            <a:spLocks noGrp="1"/>
+          </p:cNvSpPr>
+          <p:nvPr>
+            <p:ph type="subTitle" idx="1"/>
+          </p:nvPr>
+        </p:nvSpPr>
+        <p:spPr/>
+        <p:txBody>
+          <a:bodyPr/>
+          <a:lstStyle/>
+          <a:p>
+            <a:r>
+              <a:rPr lang="en-US" dirty="0"/>
+              <a:t>For more information contact:</a:t>
+            </a:r>
+            <a:br>
+              <a:rPr lang="en-US" dirty="0"/>
+            </a:br>
+            <a:r>
+              <a:rPr lang="en-US" dirty="0"/>
+              <a:t>Milton Camacho</a:t>
+            </a:r>
+          </a:p>
+          <a:p>
+            <a:r>
+              <a:rPr lang="en-US" dirty="0"/>
+              <a:t>David </a:t>
+            </a:r>
+            <a:r>
+              <a:rPr lang="en-US" dirty="0" err="1"/>
+              <a:t>Deepwell</a:t>
+            </a:r>
+            <a:endParaRPr lang="en-US" dirty="0"/>
+          </a:p>
+          <a:p>
+            <a:r>
+              <a:rPr lang="en-US" dirty="0"/>
+              <a:t>Pedro Martinez</a:t>
+            </a:r>
+          </a:p>
+        </p:txBody>
+      </p:sp>
+      <p:sp>
+        <p:nvSpPr>
+          <p:cNvPr id="4" name="Text Placeholder 3">
+            <a:extLst>
+              <a:ext uri="{FF2B5EF4-FFF2-40B4-BE49-F238E27FC236}">
+                <a16:creationId xmlns:a16="http://schemas.microsoft.com/office/drawing/2014/main" id="{41AD0068-DA54-9A4F-C6D8-57D93603B83A}"/>
+              </a:ext>
+            </a:extLst>
+          </p:cNvPr>
+          <p:cNvSpPr>
+            <a:spLocks noGrp="1"/>
+          </p:cNvSpPr>
+          <p:nvPr>
+            <p:ph type="body" sz="quarter" idx="10"/>
+          </p:nvPr>
+        </p:nvSpPr>
+        <p:spPr>
+          <a:xfrm>
+            <a:off x="1500642" y="4955871"/>
+            <a:ext cx="8418337" cy="1468879"/>
+          </a:xfrm>
+        </p:spPr>
+        <p:txBody>
+          <a:bodyPr/>
+          <a:lstStyle/>
+          <a:p>
+            <a:r>
+              <a:rPr lang="en-US" dirty="0" err="1"/>
+              <a:t>Milton.camachocamach@ucalgary.ca</a:t>
+            </a:r>
+            <a:endParaRPr lang="en-US" dirty="0"/>
+          </a:p>
+        </p:txBody>
+      </p:sp>
+    </p:spTree>
+    <p:extLst>
+      <p:ext uri="{BB962C8B-B14F-4D97-AF65-F5344CB8AC3E}">
+        <p14:creationId xmlns:p14="http://schemas.microsoft.com/office/powerpoint/2010/main" val="2131250290"/>
       </p:ext>
     </p:extLst>
   </p:cSld>

</xml_diff>